<commit_message>
added basic flowcharts for LED bar and LCD
</commit_message>
<xml_diff>
--- a/docs/planning/PinDiagramFlowChart.pptx
+++ b/docs/planning/PinDiagramFlowChart.pptx
@@ -9,9 +9,11 @@
     <p:sldId id="266" r:id="rId3"/>
     <p:sldId id="267" r:id="rId4"/>
     <p:sldId id="256" r:id="rId5"/>
-    <p:sldId id="262" r:id="rId6"/>
-    <p:sldId id="263" r:id="rId7"/>
-    <p:sldId id="265" r:id="rId8"/>
+    <p:sldId id="268" r:id="rId6"/>
+    <p:sldId id="270" r:id="rId7"/>
+    <p:sldId id="262" r:id="rId8"/>
+    <p:sldId id="263" r:id="rId9"/>
+    <p:sldId id="265" r:id="rId10"/>
   </p:sldIdLst>
   <p:sldSz cx="12192000" cy="6858000"/>
   <p:notesSz cx="6858000" cy="9144000"/>
@@ -265,7 +267,7 @@
           <a:p>
             <a:fld id="{43859641-87B3-4D4C-932C-222F1A0ADC66}" type="datetimeFigureOut">
               <a:rPr lang="en-US" smtClean="0"/>
-              <a:t>3/6/2025</a:t>
+              <a:t>3/27/2025</a:t>
             </a:fld>
             <a:endParaRPr lang="en-US"/>
           </a:p>
@@ -463,7 +465,7 @@
           <a:p>
             <a:fld id="{43859641-87B3-4D4C-932C-222F1A0ADC66}" type="datetimeFigureOut">
               <a:rPr lang="en-US" smtClean="0"/>
-              <a:t>3/6/2025</a:t>
+              <a:t>3/27/2025</a:t>
             </a:fld>
             <a:endParaRPr lang="en-US"/>
           </a:p>
@@ -671,7 +673,7 @@
           <a:p>
             <a:fld id="{43859641-87B3-4D4C-932C-222F1A0ADC66}" type="datetimeFigureOut">
               <a:rPr lang="en-US" smtClean="0"/>
-              <a:t>3/6/2025</a:t>
+              <a:t>3/27/2025</a:t>
             </a:fld>
             <a:endParaRPr lang="en-US"/>
           </a:p>
@@ -869,7 +871,7 @@
           <a:p>
             <a:fld id="{43859641-87B3-4D4C-932C-222F1A0ADC66}" type="datetimeFigureOut">
               <a:rPr lang="en-US" smtClean="0"/>
-              <a:t>3/6/2025</a:t>
+              <a:t>3/27/2025</a:t>
             </a:fld>
             <a:endParaRPr lang="en-US"/>
           </a:p>
@@ -1144,7 +1146,7 @@
           <a:p>
             <a:fld id="{43859641-87B3-4D4C-932C-222F1A0ADC66}" type="datetimeFigureOut">
               <a:rPr lang="en-US" smtClean="0"/>
-              <a:t>3/6/2025</a:t>
+              <a:t>3/27/2025</a:t>
             </a:fld>
             <a:endParaRPr lang="en-US"/>
           </a:p>
@@ -1409,7 +1411,7 @@
           <a:p>
             <a:fld id="{43859641-87B3-4D4C-932C-222F1A0ADC66}" type="datetimeFigureOut">
               <a:rPr lang="en-US" smtClean="0"/>
-              <a:t>3/6/2025</a:t>
+              <a:t>3/27/2025</a:t>
             </a:fld>
             <a:endParaRPr lang="en-US"/>
           </a:p>
@@ -1821,7 +1823,7 @@
           <a:p>
             <a:fld id="{43859641-87B3-4D4C-932C-222F1A0ADC66}" type="datetimeFigureOut">
               <a:rPr lang="en-US" smtClean="0"/>
-              <a:t>3/6/2025</a:t>
+              <a:t>3/27/2025</a:t>
             </a:fld>
             <a:endParaRPr lang="en-US"/>
           </a:p>
@@ -1962,7 +1964,7 @@
           <a:p>
             <a:fld id="{43859641-87B3-4D4C-932C-222F1A0ADC66}" type="datetimeFigureOut">
               <a:rPr lang="en-US" smtClean="0"/>
-              <a:t>3/6/2025</a:t>
+              <a:t>3/27/2025</a:t>
             </a:fld>
             <a:endParaRPr lang="en-US"/>
           </a:p>
@@ -2075,7 +2077,7 @@
           <a:p>
             <a:fld id="{43859641-87B3-4D4C-932C-222F1A0ADC66}" type="datetimeFigureOut">
               <a:rPr lang="en-US" smtClean="0"/>
-              <a:t>3/6/2025</a:t>
+              <a:t>3/27/2025</a:t>
             </a:fld>
             <a:endParaRPr lang="en-US"/>
           </a:p>
@@ -2386,7 +2388,7 @@
           <a:p>
             <a:fld id="{43859641-87B3-4D4C-932C-222F1A0ADC66}" type="datetimeFigureOut">
               <a:rPr lang="en-US" smtClean="0"/>
-              <a:t>3/6/2025</a:t>
+              <a:t>3/27/2025</a:t>
             </a:fld>
             <a:endParaRPr lang="en-US"/>
           </a:p>
@@ -2674,7 +2676,7 @@
           <a:p>
             <a:fld id="{43859641-87B3-4D4C-932C-222F1A0ADC66}" type="datetimeFigureOut">
               <a:rPr lang="en-US" smtClean="0"/>
-              <a:t>3/6/2025</a:t>
+              <a:t>3/27/2025</a:t>
             </a:fld>
             <a:endParaRPr lang="en-US"/>
           </a:p>
@@ -2915,7 +2917,7 @@
           <a:p>
             <a:fld id="{43859641-87B3-4D4C-932C-222F1A0ADC66}" type="datetimeFigureOut">
               <a:rPr lang="en-US" smtClean="0"/>
-              <a:t>3/6/2025</a:t>
+              <a:t>3/27/2025</a:t>
             </a:fld>
             <a:endParaRPr lang="en-US"/>
           </a:p>
@@ -3368,7 +3370,7 @@
           <a:p>
             <a:r>
               <a:rPr lang="en-US" sz="4000" dirty="0"/>
-              <a:t>Project 3 Pin Diagram - Master</a:t>
+              <a:t>Project 4 Pin Diagram - Master</a:t>
             </a:r>
           </a:p>
         </p:txBody>
@@ -5246,7 +5248,7 @@
           <a:p>
             <a:r>
               <a:rPr lang="en-US" sz="4000" dirty="0"/>
-              <a:t>Project 3 Pin Diagram – LED Slave</a:t>
+              <a:t>Project 4 Pin Diagram – LED Slave</a:t>
             </a:r>
           </a:p>
         </p:txBody>
@@ -10967,7 +10969,7 @@
           <a:p>
             <a:r>
               <a:rPr lang="en-US" sz="4000" dirty="0"/>
-              <a:t>Project 3 Flowchart - Main</a:t>
+              <a:t>Project 4 Flowchart - Main</a:t>
             </a:r>
           </a:p>
         </p:txBody>
@@ -11674,6 +11676,1591 @@
 </file>
 
 <file path=ppt/slides/slide5.xml><?xml version="1.0" encoding="utf-8"?>
+<p:sld xmlns:a="http://schemas.openxmlformats.org/drawingml/2006/main" xmlns:r="http://schemas.openxmlformats.org/officeDocument/2006/relationships" xmlns:p="http://schemas.openxmlformats.org/presentationml/2006/main">
+  <p:cSld>
+    <p:spTree>
+      <p:nvGrpSpPr>
+        <p:cNvPr id="1" name="">
+          <a:extLst>
+            <a:ext uri="{FF2B5EF4-FFF2-40B4-BE49-F238E27FC236}">
+              <a16:creationId xmlns:a16="http://schemas.microsoft.com/office/drawing/2014/main" id="{9AAFFC45-10F3-74E7-6D87-CEB848B25EDB}"/>
+            </a:ext>
+          </a:extLst>
+        </p:cNvPr>
+        <p:cNvGrpSpPr/>
+        <p:nvPr/>
+      </p:nvGrpSpPr>
+      <p:grpSpPr>
+        <a:xfrm>
+          <a:off x="0" y="0"/>
+          <a:ext cx="0" cy="0"/>
+          <a:chOff x="0" y="0"/>
+          <a:chExt cx="0" cy="0"/>
+        </a:xfrm>
+      </p:grpSpPr>
+      <p:cxnSp>
+        <p:nvCxnSpPr>
+          <p:cNvPr id="23" name="Straight Connector 22">
+            <a:extLst>
+              <a:ext uri="{FF2B5EF4-FFF2-40B4-BE49-F238E27FC236}">
+                <a16:creationId xmlns:a16="http://schemas.microsoft.com/office/drawing/2014/main" id="{F66D092F-D643-716A-D460-55602BCD6BE3}"/>
+              </a:ext>
+            </a:extLst>
+          </p:cNvPr>
+          <p:cNvCxnSpPr/>
+          <p:nvPr/>
+        </p:nvCxnSpPr>
+        <p:spPr>
+          <a:xfrm>
+            <a:off x="5142217" y="5538599"/>
+            <a:ext cx="998924" cy="0"/>
+          </a:xfrm>
+          <a:prstGeom prst="line">
+            <a:avLst/>
+          </a:prstGeom>
+          <a:ln w="38100">
+            <a:solidFill>
+              <a:schemeClr val="tx1"/>
+            </a:solidFill>
+          </a:ln>
+        </p:spPr>
+        <p:style>
+          <a:lnRef idx="2">
+            <a:schemeClr val="accent1"/>
+          </a:lnRef>
+          <a:fillRef idx="0">
+            <a:schemeClr val="accent1"/>
+          </a:fillRef>
+          <a:effectRef idx="1">
+            <a:schemeClr val="accent1"/>
+          </a:effectRef>
+          <a:fontRef idx="minor">
+            <a:schemeClr val="tx1"/>
+          </a:fontRef>
+        </p:style>
+      </p:cxnSp>
+      <p:cxnSp>
+        <p:nvCxnSpPr>
+          <p:cNvPr id="89" name="Straight Arrow Connector 88">
+            <a:extLst>
+              <a:ext uri="{FF2B5EF4-FFF2-40B4-BE49-F238E27FC236}">
+                <a16:creationId xmlns:a16="http://schemas.microsoft.com/office/drawing/2014/main" id="{8E38A15F-F0DA-00C5-053E-15DA856B3EC3}"/>
+              </a:ext>
+            </a:extLst>
+          </p:cNvPr>
+          <p:cNvCxnSpPr>
+            <a:cxnSpLocks/>
+          </p:cNvCxnSpPr>
+          <p:nvPr/>
+        </p:nvCxnSpPr>
+        <p:spPr>
+          <a:xfrm>
+            <a:off x="3205245" y="1455880"/>
+            <a:ext cx="1217234" cy="0"/>
+          </a:xfrm>
+          <a:prstGeom prst="straightConnector1">
+            <a:avLst/>
+          </a:prstGeom>
+          <a:ln w="76200">
+            <a:solidFill>
+              <a:schemeClr val="tx1"/>
+            </a:solidFill>
+            <a:tailEnd type="triangle"/>
+          </a:ln>
+        </p:spPr>
+        <p:style>
+          <a:lnRef idx="2">
+            <a:schemeClr val="dk1"/>
+          </a:lnRef>
+          <a:fillRef idx="0">
+            <a:schemeClr val="dk1"/>
+          </a:fillRef>
+          <a:effectRef idx="1">
+            <a:schemeClr val="dk1"/>
+          </a:effectRef>
+          <a:fontRef idx="minor">
+            <a:schemeClr val="tx1"/>
+          </a:fontRef>
+        </p:style>
+      </p:cxnSp>
+      <p:sp>
+        <p:nvSpPr>
+          <p:cNvPr id="4" name="Flowchart: Document 3">
+            <a:extLst>
+              <a:ext uri="{FF2B5EF4-FFF2-40B4-BE49-F238E27FC236}">
+                <a16:creationId xmlns:a16="http://schemas.microsoft.com/office/drawing/2014/main" id="{6C5B6324-2DED-2E79-C96E-5D7F2E9D09E2}"/>
+              </a:ext>
+            </a:extLst>
+          </p:cNvPr>
+          <p:cNvSpPr/>
+          <p:nvPr/>
+        </p:nvSpPr>
+        <p:spPr>
+          <a:xfrm>
+            <a:off x="294524" y="1304960"/>
+            <a:ext cx="2910722" cy="4395192"/>
+          </a:xfrm>
+          <a:prstGeom prst="flowChartDocument">
+            <a:avLst/>
+          </a:prstGeom>
+          <a:solidFill>
+            <a:srgbClr val="19A796"/>
+          </a:solidFill>
+        </p:spPr>
+        <p:style>
+          <a:lnRef idx="2">
+            <a:schemeClr val="accent1">
+              <a:shade val="15000"/>
+            </a:schemeClr>
+          </a:lnRef>
+          <a:fillRef idx="1">
+            <a:schemeClr val="accent1"/>
+          </a:fillRef>
+          <a:effectRef idx="0">
+            <a:schemeClr val="accent1"/>
+          </a:effectRef>
+          <a:fontRef idx="minor">
+            <a:schemeClr val="lt1"/>
+          </a:fontRef>
+        </p:style>
+        <p:txBody>
+          <a:bodyPr wrap="square" rtlCol="0" anchor="t" anchorCtr="0">
+            <a:spAutoFit/>
+          </a:bodyPr>
+          <a:lstStyle/>
+          <a:p>
+            <a:r>
+              <a:rPr lang="en-US" sz="1600" b="1" u="sng" dirty="0"/>
+              <a:t>Init</a:t>
+            </a:r>
+          </a:p>
+          <a:p>
+            <a:pPr marL="285750" indent="-285750">
+              <a:buFont typeface="Arial" panose="020B0604020202020204" pitchFamily="34" charset="0"/>
+              <a:buChar char="•"/>
+            </a:pPr>
+            <a:r>
+              <a:rPr lang="en-US" sz="1600" dirty="0"/>
+              <a:t>Heartbeat on P2.0</a:t>
+            </a:r>
+          </a:p>
+          <a:p>
+            <a:pPr marL="285750" indent="-285750">
+              <a:buFont typeface="Arial" panose="020B0604020202020204" pitchFamily="34" charset="0"/>
+              <a:buChar char="•"/>
+            </a:pPr>
+            <a:r>
+              <a:rPr lang="en-US" sz="1600" dirty="0"/>
+              <a:t>Initialize LED 1-8 as outputs on P1.1, P1.0, P2.7, P2.6, P1.4, P1.5, P1.6, P1.7 respectively</a:t>
+            </a:r>
+          </a:p>
+          <a:p>
+            <a:pPr marL="285750" indent="-285750">
+              <a:buFont typeface="Arial" panose="020B0604020202020204" pitchFamily="34" charset="0"/>
+              <a:buChar char="•"/>
+            </a:pPr>
+            <a:r>
+              <a:rPr lang="en-US" sz="1600" dirty="0"/>
+              <a:t>Initialize vars for pattern display (patterns, vars for iterating through and pattern memory)</a:t>
+            </a:r>
+          </a:p>
+          <a:p>
+            <a:pPr marL="285750" indent="-285750">
+              <a:buFont typeface="Arial" panose="020B0604020202020204" pitchFamily="34" charset="0"/>
+              <a:buChar char="•"/>
+            </a:pPr>
+            <a:r>
+              <a:rPr lang="en-US" sz="1600" dirty="0"/>
+              <a:t>Timer for displaying patterns on TB1</a:t>
+            </a:r>
+          </a:p>
+          <a:p>
+            <a:pPr marL="285750" indent="-285750">
+              <a:buFont typeface="Arial" panose="020B0604020202020204" pitchFamily="34" charset="0"/>
+              <a:buChar char="•"/>
+            </a:pPr>
+            <a:r>
+              <a:rPr lang="en-US" sz="1600" dirty="0"/>
+              <a:t>I2C slave operation</a:t>
+            </a:r>
+          </a:p>
+          <a:p>
+            <a:pPr marL="285750" indent="-285750">
+              <a:buFont typeface="Arial" panose="020B0604020202020204" pitchFamily="34" charset="0"/>
+              <a:buChar char="•"/>
+            </a:pPr>
+            <a:endParaRPr lang="en-US" sz="1600" dirty="0"/>
+          </a:p>
+        </p:txBody>
+      </p:sp>
+      <p:sp>
+        <p:nvSpPr>
+          <p:cNvPr id="5" name="Rectangle: Rounded Corners 4">
+            <a:extLst>
+              <a:ext uri="{FF2B5EF4-FFF2-40B4-BE49-F238E27FC236}">
+                <a16:creationId xmlns:a16="http://schemas.microsoft.com/office/drawing/2014/main" id="{AE8E72EE-CE70-A888-1FC3-71FEC1C1D94E}"/>
+              </a:ext>
+            </a:extLst>
+          </p:cNvPr>
+          <p:cNvSpPr/>
+          <p:nvPr/>
+        </p:nvSpPr>
+        <p:spPr>
+          <a:xfrm>
+            <a:off x="4422479" y="1268594"/>
+            <a:ext cx="2078958" cy="374571"/>
+          </a:xfrm>
+          <a:prstGeom prst="roundRect">
+            <a:avLst/>
+          </a:prstGeom>
+          <a:solidFill>
+            <a:schemeClr val="accent2"/>
+          </a:solidFill>
+        </p:spPr>
+        <p:style>
+          <a:lnRef idx="2">
+            <a:schemeClr val="accent1">
+              <a:shade val="15000"/>
+            </a:schemeClr>
+          </a:lnRef>
+          <a:fillRef idx="1">
+            <a:schemeClr val="accent1"/>
+          </a:fillRef>
+          <a:effectRef idx="0">
+            <a:schemeClr val="accent1"/>
+          </a:effectRef>
+          <a:fontRef idx="minor">
+            <a:schemeClr val="lt1"/>
+          </a:fontRef>
+        </p:style>
+        <p:txBody>
+          <a:bodyPr wrap="square" rtlCol="0" anchor="ctr">
+            <a:spAutoFit/>
+          </a:bodyPr>
+          <a:lstStyle/>
+          <a:p>
+            <a:pPr algn="ctr"/>
+            <a:r>
+              <a:rPr lang="en-US" sz="1600" b="1" u="sng" dirty="0"/>
+              <a:t>Main</a:t>
+            </a:r>
+          </a:p>
+        </p:txBody>
+      </p:sp>
+      <p:sp>
+        <p:nvSpPr>
+          <p:cNvPr id="87" name="TextBox 86">
+            <a:extLst>
+              <a:ext uri="{FF2B5EF4-FFF2-40B4-BE49-F238E27FC236}">
+                <a16:creationId xmlns:a16="http://schemas.microsoft.com/office/drawing/2014/main" id="{5EB01609-3FFE-E669-AF53-9163884FC31C}"/>
+              </a:ext>
+            </a:extLst>
+          </p:cNvPr>
+          <p:cNvSpPr txBox="1"/>
+          <p:nvPr/>
+        </p:nvSpPr>
+        <p:spPr>
+          <a:xfrm>
+            <a:off x="3205245" y="241954"/>
+            <a:ext cx="6637202" cy="707886"/>
+          </a:xfrm>
+          <a:prstGeom prst="rect">
+            <a:avLst/>
+          </a:prstGeom>
+          <a:noFill/>
+        </p:spPr>
+        <p:txBody>
+          <a:bodyPr wrap="none" rtlCol="0">
+            <a:spAutoFit/>
+          </a:bodyPr>
+          <a:lstStyle/>
+          <a:p>
+            <a:r>
+              <a:rPr lang="en-US" sz="4000" dirty="0"/>
+              <a:t>Project 4 Flowchart – LED Bar</a:t>
+            </a:r>
+          </a:p>
+        </p:txBody>
+      </p:sp>
+      <p:cxnSp>
+        <p:nvCxnSpPr>
+          <p:cNvPr id="10" name="Straight Arrow Connector 9">
+            <a:extLst>
+              <a:ext uri="{FF2B5EF4-FFF2-40B4-BE49-F238E27FC236}">
+                <a16:creationId xmlns:a16="http://schemas.microsoft.com/office/drawing/2014/main" id="{7F75AAF5-5C8D-FFB2-1B13-EAE525AE8649}"/>
+              </a:ext>
+            </a:extLst>
+          </p:cNvPr>
+          <p:cNvCxnSpPr>
+            <a:cxnSpLocks/>
+            <a:stCxn id="5" idx="2"/>
+          </p:cNvCxnSpPr>
+          <p:nvPr/>
+        </p:nvCxnSpPr>
+        <p:spPr>
+          <a:xfrm>
+            <a:off x="5461958" y="1643165"/>
+            <a:ext cx="0" cy="442616"/>
+          </a:xfrm>
+          <a:prstGeom prst="straightConnector1">
+            <a:avLst/>
+          </a:prstGeom>
+          <a:ln w="76200">
+            <a:solidFill>
+              <a:schemeClr val="tx1"/>
+            </a:solidFill>
+            <a:tailEnd type="triangle"/>
+          </a:ln>
+        </p:spPr>
+        <p:style>
+          <a:lnRef idx="2">
+            <a:schemeClr val="dk1"/>
+          </a:lnRef>
+          <a:fillRef idx="0">
+            <a:schemeClr val="dk1"/>
+          </a:fillRef>
+          <a:effectRef idx="1">
+            <a:schemeClr val="dk1"/>
+          </a:effectRef>
+          <a:fontRef idx="minor">
+            <a:schemeClr val="tx1"/>
+          </a:fontRef>
+        </p:style>
+      </p:cxnSp>
+      <p:cxnSp>
+        <p:nvCxnSpPr>
+          <p:cNvPr id="13" name="Straight Arrow Connector 12">
+            <a:extLst>
+              <a:ext uri="{FF2B5EF4-FFF2-40B4-BE49-F238E27FC236}">
+                <a16:creationId xmlns:a16="http://schemas.microsoft.com/office/drawing/2014/main" id="{3025971C-908A-B2A8-C014-F41209C25FEA}"/>
+              </a:ext>
+            </a:extLst>
+          </p:cNvPr>
+          <p:cNvCxnSpPr>
+            <a:cxnSpLocks/>
+          </p:cNvCxnSpPr>
+          <p:nvPr/>
+        </p:nvCxnSpPr>
+        <p:spPr>
+          <a:xfrm>
+            <a:off x="5461958" y="3793123"/>
+            <a:ext cx="0" cy="442616"/>
+          </a:xfrm>
+          <a:prstGeom prst="straightConnector1">
+            <a:avLst/>
+          </a:prstGeom>
+          <a:ln w="76200">
+            <a:solidFill>
+              <a:schemeClr val="tx1"/>
+            </a:solidFill>
+            <a:tailEnd type="triangle"/>
+          </a:ln>
+        </p:spPr>
+        <p:style>
+          <a:lnRef idx="2">
+            <a:schemeClr val="dk1"/>
+          </a:lnRef>
+          <a:fillRef idx="0">
+            <a:schemeClr val="dk1"/>
+          </a:fillRef>
+          <a:effectRef idx="1">
+            <a:schemeClr val="dk1"/>
+          </a:effectRef>
+          <a:fontRef idx="minor">
+            <a:schemeClr val="tx1"/>
+          </a:fontRef>
+        </p:style>
+      </p:cxnSp>
+      <p:sp>
+        <p:nvSpPr>
+          <p:cNvPr id="14" name="Rectangle 13">
+            <a:extLst>
+              <a:ext uri="{FF2B5EF4-FFF2-40B4-BE49-F238E27FC236}">
+                <a16:creationId xmlns:a16="http://schemas.microsoft.com/office/drawing/2014/main" id="{9819C3FA-6EFA-F97C-0A9D-7D4A1335AED4}"/>
+              </a:ext>
+            </a:extLst>
+          </p:cNvPr>
+          <p:cNvSpPr/>
+          <p:nvPr/>
+        </p:nvSpPr>
+        <p:spPr>
+          <a:xfrm>
+            <a:off x="3205245" y="5392375"/>
+            <a:ext cx="2204390" cy="307777"/>
+          </a:xfrm>
+          <a:prstGeom prst="rect">
+            <a:avLst/>
+          </a:prstGeom>
+          <a:solidFill>
+            <a:schemeClr val="tx2">
+              <a:lumMod val="50000"/>
+              <a:lumOff val="50000"/>
+            </a:schemeClr>
+          </a:solidFill>
+        </p:spPr>
+        <p:style>
+          <a:lnRef idx="2">
+            <a:schemeClr val="accent1">
+              <a:shade val="15000"/>
+            </a:schemeClr>
+          </a:lnRef>
+          <a:fillRef idx="1">
+            <a:schemeClr val="accent1"/>
+          </a:fillRef>
+          <a:effectRef idx="0">
+            <a:schemeClr val="accent1"/>
+          </a:effectRef>
+          <a:fontRef idx="minor">
+            <a:schemeClr val="lt1"/>
+          </a:fontRef>
+        </p:style>
+        <p:txBody>
+          <a:bodyPr wrap="square" lIns="91440" tIns="45720" rIns="91440" bIns="45720" rtlCol="0" anchor="ctr">
+            <a:spAutoFit/>
+          </a:bodyPr>
+          <a:lstStyle/>
+          <a:p>
+            <a:pPr algn="ctr"/>
+            <a:r>
+              <a:rPr lang="en-US" sz="1400" dirty="0"/>
+              <a:t>Set delay fast</a:t>
+            </a:r>
+          </a:p>
+        </p:txBody>
+      </p:sp>
+      <p:sp>
+        <p:nvSpPr>
+          <p:cNvPr id="16" name="Rectangle 15">
+            <a:extLst>
+              <a:ext uri="{FF2B5EF4-FFF2-40B4-BE49-F238E27FC236}">
+                <a16:creationId xmlns:a16="http://schemas.microsoft.com/office/drawing/2014/main" id="{15CB99FB-6AF2-DF0E-7F70-E1944D7BA569}"/>
+              </a:ext>
+            </a:extLst>
+          </p:cNvPr>
+          <p:cNvSpPr/>
+          <p:nvPr/>
+        </p:nvSpPr>
+        <p:spPr>
+          <a:xfrm>
+            <a:off x="4359763" y="2094137"/>
+            <a:ext cx="2204390" cy="307777"/>
+          </a:xfrm>
+          <a:prstGeom prst="rect">
+            <a:avLst/>
+          </a:prstGeom>
+          <a:solidFill>
+            <a:schemeClr val="tx2">
+              <a:lumMod val="50000"/>
+              <a:lumOff val="50000"/>
+            </a:schemeClr>
+          </a:solidFill>
+        </p:spPr>
+        <p:style>
+          <a:lnRef idx="2">
+            <a:schemeClr val="accent1">
+              <a:shade val="15000"/>
+            </a:schemeClr>
+          </a:lnRef>
+          <a:fillRef idx="1">
+            <a:schemeClr val="accent1"/>
+          </a:fillRef>
+          <a:effectRef idx="0">
+            <a:schemeClr val="accent1"/>
+          </a:effectRef>
+          <a:fontRef idx="minor">
+            <a:schemeClr val="lt1"/>
+          </a:fontRef>
+        </p:style>
+        <p:txBody>
+          <a:bodyPr wrap="square" lIns="91440" tIns="45720" rIns="91440" bIns="45720" rtlCol="0" anchor="ctr">
+            <a:spAutoFit/>
+          </a:bodyPr>
+          <a:lstStyle/>
+          <a:p>
+            <a:pPr algn="ctr"/>
+            <a:r>
+              <a:rPr lang="en-US" sz="1400" dirty="0"/>
+              <a:t>Toggle Heartbeat LED</a:t>
+            </a:r>
+          </a:p>
+        </p:txBody>
+      </p:sp>
+      <p:cxnSp>
+        <p:nvCxnSpPr>
+          <p:cNvPr id="17" name="Straight Arrow Connector 16">
+            <a:extLst>
+              <a:ext uri="{FF2B5EF4-FFF2-40B4-BE49-F238E27FC236}">
+                <a16:creationId xmlns:a16="http://schemas.microsoft.com/office/drawing/2014/main" id="{7FA965D0-D202-EDDA-7741-C3274C008DE6}"/>
+              </a:ext>
+            </a:extLst>
+          </p:cNvPr>
+          <p:cNvCxnSpPr>
+            <a:cxnSpLocks/>
+          </p:cNvCxnSpPr>
+          <p:nvPr/>
+        </p:nvCxnSpPr>
+        <p:spPr>
+          <a:xfrm>
+            <a:off x="5461958" y="2401914"/>
+            <a:ext cx="0" cy="442616"/>
+          </a:xfrm>
+          <a:prstGeom prst="straightConnector1">
+            <a:avLst/>
+          </a:prstGeom>
+          <a:ln w="76200">
+            <a:solidFill>
+              <a:schemeClr val="tx1"/>
+            </a:solidFill>
+            <a:tailEnd type="triangle"/>
+          </a:ln>
+        </p:spPr>
+        <p:style>
+          <a:lnRef idx="2">
+            <a:schemeClr val="dk1"/>
+          </a:lnRef>
+          <a:fillRef idx="0">
+            <a:schemeClr val="dk1"/>
+          </a:fillRef>
+          <a:effectRef idx="1">
+            <a:schemeClr val="dk1"/>
+          </a:effectRef>
+          <a:fontRef idx="minor">
+            <a:schemeClr val="tx1"/>
+          </a:fontRef>
+        </p:style>
+      </p:cxnSp>
+      <p:sp>
+        <p:nvSpPr>
+          <p:cNvPr id="6" name="Diamond 5">
+            <a:extLst>
+              <a:ext uri="{FF2B5EF4-FFF2-40B4-BE49-F238E27FC236}">
+                <a16:creationId xmlns:a16="http://schemas.microsoft.com/office/drawing/2014/main" id="{75FE6E4B-988A-7618-B3FF-E4328E63DD1A}"/>
+              </a:ext>
+            </a:extLst>
+          </p:cNvPr>
+          <p:cNvSpPr/>
+          <p:nvPr/>
+        </p:nvSpPr>
+        <p:spPr>
+          <a:xfrm>
+            <a:off x="4359763" y="2817684"/>
+            <a:ext cx="2204390" cy="1039356"/>
+          </a:xfrm>
+          <a:prstGeom prst="diamond">
+            <a:avLst/>
+          </a:prstGeom>
+          <a:solidFill>
+            <a:schemeClr val="tx2">
+              <a:lumMod val="50000"/>
+              <a:lumOff val="50000"/>
+            </a:schemeClr>
+          </a:solidFill>
+        </p:spPr>
+        <p:style>
+          <a:lnRef idx="2">
+            <a:schemeClr val="accent1">
+              <a:shade val="15000"/>
+            </a:schemeClr>
+          </a:lnRef>
+          <a:fillRef idx="1">
+            <a:schemeClr val="accent1"/>
+          </a:fillRef>
+          <a:effectRef idx="0">
+            <a:schemeClr val="accent1"/>
+          </a:effectRef>
+          <a:fontRef idx="minor">
+            <a:schemeClr val="lt1"/>
+          </a:fontRef>
+        </p:style>
+        <p:txBody>
+          <a:bodyPr wrap="square" rtlCol="0" anchor="ctr">
+            <a:spAutoFit/>
+          </a:bodyPr>
+          <a:lstStyle/>
+          <a:p>
+            <a:pPr algn="ctr"/>
+            <a:r>
+              <a:rPr lang="en-US" sz="1400" dirty="0"/>
+              <a:t>Wait for DELAY</a:t>
+            </a:r>
+          </a:p>
+        </p:txBody>
+      </p:sp>
+      <p:sp>
+        <p:nvSpPr>
+          <p:cNvPr id="21" name="Diamond 20">
+            <a:extLst>
+              <a:ext uri="{FF2B5EF4-FFF2-40B4-BE49-F238E27FC236}">
+                <a16:creationId xmlns:a16="http://schemas.microsoft.com/office/drawing/2014/main" id="{F8DEA2A7-9F30-5047-FA13-B7D532CA5DDA}"/>
+              </a:ext>
+            </a:extLst>
+          </p:cNvPr>
+          <p:cNvSpPr/>
+          <p:nvPr/>
+        </p:nvSpPr>
+        <p:spPr>
+          <a:xfrm>
+            <a:off x="4359763" y="4226019"/>
+            <a:ext cx="2204390" cy="1039356"/>
+          </a:xfrm>
+          <a:prstGeom prst="diamond">
+            <a:avLst/>
+          </a:prstGeom>
+          <a:solidFill>
+            <a:schemeClr val="tx2">
+              <a:lumMod val="50000"/>
+              <a:lumOff val="50000"/>
+            </a:schemeClr>
+          </a:solidFill>
+        </p:spPr>
+        <p:style>
+          <a:lnRef idx="2">
+            <a:schemeClr val="accent1">
+              <a:shade val="15000"/>
+            </a:schemeClr>
+          </a:lnRef>
+          <a:fillRef idx="1">
+            <a:schemeClr val="accent1"/>
+          </a:fillRef>
+          <a:effectRef idx="0">
+            <a:schemeClr val="accent1"/>
+          </a:effectRef>
+          <a:fontRef idx="minor">
+            <a:schemeClr val="lt1"/>
+          </a:fontRef>
+        </p:style>
+        <p:txBody>
+          <a:bodyPr wrap="square" rtlCol="0" anchor="ctr">
+            <a:spAutoFit/>
+          </a:bodyPr>
+          <a:lstStyle/>
+          <a:p>
+            <a:pPr algn="ctr"/>
+            <a:r>
+              <a:rPr lang="en-US" sz="1400" dirty="0"/>
+              <a:t>Is I2C RX triggered?</a:t>
+            </a:r>
+          </a:p>
+        </p:txBody>
+      </p:sp>
+      <p:cxnSp>
+        <p:nvCxnSpPr>
+          <p:cNvPr id="22" name="Straight Arrow Connector 21">
+            <a:extLst>
+              <a:ext uri="{FF2B5EF4-FFF2-40B4-BE49-F238E27FC236}">
+                <a16:creationId xmlns:a16="http://schemas.microsoft.com/office/drawing/2014/main" id="{C2AA4BCE-8F2B-F971-58E3-E9EDCEB7B47B}"/>
+              </a:ext>
+            </a:extLst>
+          </p:cNvPr>
+          <p:cNvCxnSpPr>
+            <a:cxnSpLocks/>
+            <a:endCxn id="14" idx="0"/>
+          </p:cNvCxnSpPr>
+          <p:nvPr/>
+        </p:nvCxnSpPr>
+        <p:spPr>
+          <a:xfrm flipH="1">
+            <a:off x="4307440" y="4754080"/>
+            <a:ext cx="64703" cy="638295"/>
+          </a:xfrm>
+          <a:prstGeom prst="straightConnector1">
+            <a:avLst/>
+          </a:prstGeom>
+          <a:ln w="76200">
+            <a:solidFill>
+              <a:schemeClr val="tx1"/>
+            </a:solidFill>
+            <a:tailEnd type="triangle"/>
+          </a:ln>
+        </p:spPr>
+        <p:style>
+          <a:lnRef idx="2">
+            <a:schemeClr val="dk1"/>
+          </a:lnRef>
+          <a:fillRef idx="0">
+            <a:schemeClr val="dk1"/>
+          </a:fillRef>
+          <a:effectRef idx="1">
+            <a:schemeClr val="dk1"/>
+          </a:effectRef>
+          <a:fontRef idx="minor">
+            <a:schemeClr val="tx1"/>
+          </a:fontRef>
+        </p:style>
+      </p:cxnSp>
+      <p:sp>
+        <p:nvSpPr>
+          <p:cNvPr id="24" name="Arrow: U-Turn 23">
+            <a:extLst>
+              <a:ext uri="{FF2B5EF4-FFF2-40B4-BE49-F238E27FC236}">
+                <a16:creationId xmlns:a16="http://schemas.microsoft.com/office/drawing/2014/main" id="{5723857A-B608-E41C-3649-B0B5AC1981E2}"/>
+              </a:ext>
+            </a:extLst>
+          </p:cNvPr>
+          <p:cNvSpPr/>
+          <p:nvPr/>
+        </p:nvSpPr>
+        <p:spPr>
+          <a:xfrm rot="16200000" flipV="1">
+            <a:off x="4975764" y="2516175"/>
+            <a:ext cx="4487476" cy="1557371"/>
+          </a:xfrm>
+          <a:prstGeom prst="uturnArrow">
+            <a:avLst>
+              <a:gd name="adj1" fmla="val 1891"/>
+              <a:gd name="adj2" fmla="val 16345"/>
+              <a:gd name="adj3" fmla="val 15465"/>
+              <a:gd name="adj4" fmla="val 49178"/>
+              <a:gd name="adj5" fmla="val 95936"/>
+            </a:avLst>
+          </a:prstGeom>
+          <a:solidFill>
+            <a:schemeClr val="tx1"/>
+          </a:solidFill>
+        </p:spPr>
+        <p:style>
+          <a:lnRef idx="2">
+            <a:schemeClr val="accent1">
+              <a:shade val="15000"/>
+            </a:schemeClr>
+          </a:lnRef>
+          <a:fillRef idx="1">
+            <a:schemeClr val="accent1"/>
+          </a:fillRef>
+          <a:effectRef idx="0">
+            <a:schemeClr val="accent1"/>
+          </a:effectRef>
+          <a:fontRef idx="minor">
+            <a:schemeClr val="lt1"/>
+          </a:fontRef>
+        </p:style>
+        <p:txBody>
+          <a:bodyPr rtlCol="0" anchor="ctr"/>
+          <a:lstStyle/>
+          <a:p>
+            <a:pPr algn="ctr"/>
+            <a:endParaRPr lang="en-US">
+              <a:solidFill>
+                <a:schemeClr val="tx1"/>
+              </a:solidFill>
+            </a:endParaRPr>
+          </a:p>
+        </p:txBody>
+      </p:sp>
+      <p:sp>
+        <p:nvSpPr>
+          <p:cNvPr id="2" name="Rectangle 1">
+            <a:extLst>
+              <a:ext uri="{FF2B5EF4-FFF2-40B4-BE49-F238E27FC236}">
+                <a16:creationId xmlns:a16="http://schemas.microsoft.com/office/drawing/2014/main" id="{E40E7600-8806-A206-725B-3FE20B1A6A8C}"/>
+              </a:ext>
+            </a:extLst>
+          </p:cNvPr>
+          <p:cNvSpPr/>
+          <p:nvPr/>
+        </p:nvSpPr>
+        <p:spPr>
+          <a:xfrm>
+            <a:off x="5756977" y="5383993"/>
+            <a:ext cx="2204390" cy="307777"/>
+          </a:xfrm>
+          <a:prstGeom prst="rect">
+            <a:avLst/>
+          </a:prstGeom>
+          <a:solidFill>
+            <a:schemeClr val="tx2">
+              <a:lumMod val="50000"/>
+              <a:lumOff val="50000"/>
+            </a:schemeClr>
+          </a:solidFill>
+        </p:spPr>
+        <p:style>
+          <a:lnRef idx="2">
+            <a:schemeClr val="accent1">
+              <a:shade val="15000"/>
+            </a:schemeClr>
+          </a:lnRef>
+          <a:fillRef idx="1">
+            <a:schemeClr val="accent1"/>
+          </a:fillRef>
+          <a:effectRef idx="0">
+            <a:schemeClr val="accent1"/>
+          </a:effectRef>
+          <a:fontRef idx="minor">
+            <a:schemeClr val="lt1"/>
+          </a:fontRef>
+        </p:style>
+        <p:txBody>
+          <a:bodyPr wrap="square" lIns="91440" tIns="45720" rIns="91440" bIns="45720" rtlCol="0" anchor="ctr">
+            <a:spAutoFit/>
+          </a:bodyPr>
+          <a:lstStyle/>
+          <a:p>
+            <a:pPr algn="ctr"/>
+            <a:r>
+              <a:rPr lang="en-US" sz="1400" dirty="0"/>
+              <a:t>Set delay slow</a:t>
+            </a:r>
+          </a:p>
+        </p:txBody>
+      </p:sp>
+      <p:sp>
+        <p:nvSpPr>
+          <p:cNvPr id="9" name="TextBox 8">
+            <a:extLst>
+              <a:ext uri="{FF2B5EF4-FFF2-40B4-BE49-F238E27FC236}">
+                <a16:creationId xmlns:a16="http://schemas.microsoft.com/office/drawing/2014/main" id="{7538A791-2C5E-83B9-D8E2-3315D4C4C85B}"/>
+              </a:ext>
+            </a:extLst>
+          </p:cNvPr>
+          <p:cNvSpPr txBox="1"/>
+          <p:nvPr/>
+        </p:nvSpPr>
+        <p:spPr>
+          <a:xfrm>
+            <a:off x="3459413" y="4854720"/>
+            <a:ext cx="611899" cy="369332"/>
+          </a:xfrm>
+          <a:prstGeom prst="rect">
+            <a:avLst/>
+          </a:prstGeom>
+          <a:noFill/>
+        </p:spPr>
+        <p:txBody>
+          <a:bodyPr wrap="none" rtlCol="0">
+            <a:spAutoFit/>
+          </a:bodyPr>
+          <a:lstStyle/>
+          <a:p>
+            <a:r>
+              <a:rPr lang="en-US" dirty="0"/>
+              <a:t>True</a:t>
+            </a:r>
+          </a:p>
+        </p:txBody>
+      </p:sp>
+      <p:sp>
+        <p:nvSpPr>
+          <p:cNvPr id="11" name="TextBox 10">
+            <a:extLst>
+              <a:ext uri="{FF2B5EF4-FFF2-40B4-BE49-F238E27FC236}">
+                <a16:creationId xmlns:a16="http://schemas.microsoft.com/office/drawing/2014/main" id="{9A1EAB3C-3F5B-81E3-435E-1EC70818BD40}"/>
+              </a:ext>
+            </a:extLst>
+          </p:cNvPr>
+          <p:cNvSpPr txBox="1"/>
+          <p:nvPr/>
+        </p:nvSpPr>
+        <p:spPr>
+          <a:xfrm>
+            <a:off x="6859172" y="4832283"/>
+            <a:ext cx="720454" cy="369332"/>
+          </a:xfrm>
+          <a:prstGeom prst="rect">
+            <a:avLst/>
+          </a:prstGeom>
+          <a:noFill/>
+        </p:spPr>
+        <p:txBody>
+          <a:bodyPr wrap="none" rtlCol="0">
+            <a:spAutoFit/>
+          </a:bodyPr>
+          <a:lstStyle/>
+          <a:p>
+            <a:r>
+              <a:rPr lang="en-US" dirty="0"/>
+              <a:t>False</a:t>
+            </a:r>
+          </a:p>
+        </p:txBody>
+      </p:sp>
+      <p:cxnSp>
+        <p:nvCxnSpPr>
+          <p:cNvPr id="12" name="Straight Arrow Connector 11">
+            <a:extLst>
+              <a:ext uri="{FF2B5EF4-FFF2-40B4-BE49-F238E27FC236}">
+                <a16:creationId xmlns:a16="http://schemas.microsoft.com/office/drawing/2014/main" id="{3F607685-EAA3-9962-2CFC-734F7E762321}"/>
+              </a:ext>
+            </a:extLst>
+          </p:cNvPr>
+          <p:cNvCxnSpPr>
+            <a:cxnSpLocks/>
+          </p:cNvCxnSpPr>
+          <p:nvPr/>
+        </p:nvCxnSpPr>
+        <p:spPr>
+          <a:xfrm>
+            <a:off x="6604558" y="4754080"/>
+            <a:ext cx="74753" cy="638295"/>
+          </a:xfrm>
+          <a:prstGeom prst="straightConnector1">
+            <a:avLst/>
+          </a:prstGeom>
+          <a:ln w="76200">
+            <a:solidFill>
+              <a:schemeClr val="tx1"/>
+            </a:solidFill>
+            <a:tailEnd type="triangle"/>
+          </a:ln>
+        </p:spPr>
+        <p:style>
+          <a:lnRef idx="2">
+            <a:schemeClr val="dk1"/>
+          </a:lnRef>
+          <a:fillRef idx="0">
+            <a:schemeClr val="dk1"/>
+          </a:fillRef>
+          <a:effectRef idx="1">
+            <a:schemeClr val="dk1"/>
+          </a:effectRef>
+          <a:fontRef idx="minor">
+            <a:schemeClr val="tx1"/>
+          </a:fontRef>
+        </p:style>
+      </p:cxnSp>
+      <p:sp>
+        <p:nvSpPr>
+          <p:cNvPr id="27" name="Flowchart: Document 26">
+            <a:extLst>
+              <a:ext uri="{FF2B5EF4-FFF2-40B4-BE49-F238E27FC236}">
+                <a16:creationId xmlns:a16="http://schemas.microsoft.com/office/drawing/2014/main" id="{68250CFD-274A-74BA-4374-A3E6363740A6}"/>
+              </a:ext>
+            </a:extLst>
+          </p:cNvPr>
+          <p:cNvSpPr/>
+          <p:nvPr/>
+        </p:nvSpPr>
+        <p:spPr>
+          <a:xfrm>
+            <a:off x="8986754" y="1455879"/>
+            <a:ext cx="2910722" cy="2560677"/>
+          </a:xfrm>
+          <a:prstGeom prst="flowChartDocument">
+            <a:avLst/>
+          </a:prstGeom>
+          <a:solidFill>
+            <a:srgbClr val="19A796"/>
+          </a:solidFill>
+        </p:spPr>
+        <p:style>
+          <a:lnRef idx="2">
+            <a:schemeClr val="accent1">
+              <a:shade val="15000"/>
+            </a:schemeClr>
+          </a:lnRef>
+          <a:fillRef idx="1">
+            <a:schemeClr val="accent1"/>
+          </a:fillRef>
+          <a:effectRef idx="0">
+            <a:schemeClr val="accent1"/>
+          </a:effectRef>
+          <a:fontRef idx="minor">
+            <a:schemeClr val="lt1"/>
+          </a:fontRef>
+        </p:style>
+        <p:txBody>
+          <a:bodyPr wrap="square" rtlCol="0" anchor="t" anchorCtr="0">
+            <a:spAutoFit/>
+          </a:bodyPr>
+          <a:lstStyle/>
+          <a:p>
+            <a:r>
+              <a:rPr lang="en-US" sz="1600" b="1" u="sng" dirty="0"/>
+              <a:t>RX ISR:</a:t>
+            </a:r>
+          </a:p>
+          <a:p>
+            <a:pPr marL="285750" indent="-285750">
+              <a:buFont typeface="Arial" panose="020B0604020202020204" pitchFamily="34" charset="0"/>
+              <a:buChar char="•"/>
+            </a:pPr>
+            <a:r>
+              <a:rPr lang="en-US" sz="1600" dirty="0"/>
+              <a:t>Read in integer</a:t>
+            </a:r>
+          </a:p>
+          <a:p>
+            <a:pPr marL="285750" indent="-285750">
+              <a:buFont typeface="Arial" panose="020B0604020202020204" pitchFamily="34" charset="0"/>
+              <a:buChar char="•"/>
+            </a:pPr>
+            <a:r>
+              <a:rPr lang="en-US" sz="1600" dirty="0"/>
+              <a:t>Update previous pattern and associated state</a:t>
+            </a:r>
+          </a:p>
+          <a:p>
+            <a:pPr marL="285750" indent="-285750">
+              <a:buFont typeface="Arial" panose="020B0604020202020204" pitchFamily="34" charset="0"/>
+              <a:buChar char="•"/>
+            </a:pPr>
+            <a:r>
+              <a:rPr lang="en-US" sz="1600" dirty="0"/>
+              <a:t>Update pattern and state to be displayed</a:t>
+            </a:r>
+          </a:p>
+          <a:p>
+            <a:pPr marL="285750" indent="-285750">
+              <a:buFont typeface="Arial" panose="020B0604020202020204" pitchFamily="34" charset="0"/>
+              <a:buChar char="•"/>
+            </a:pPr>
+            <a:r>
+              <a:rPr lang="en-US" sz="1600" dirty="0"/>
+              <a:t>Set delay fast</a:t>
+            </a:r>
+          </a:p>
+          <a:p>
+            <a:pPr marL="285750" indent="-285750">
+              <a:buFont typeface="Arial" panose="020B0604020202020204" pitchFamily="34" charset="0"/>
+              <a:buChar char="•"/>
+            </a:pPr>
+            <a:endParaRPr lang="en-US" sz="1600" dirty="0"/>
+          </a:p>
+        </p:txBody>
+      </p:sp>
+      <p:cxnSp>
+        <p:nvCxnSpPr>
+          <p:cNvPr id="28" name="Straight Connector 27">
+            <a:extLst>
+              <a:ext uri="{FF2B5EF4-FFF2-40B4-BE49-F238E27FC236}">
+                <a16:creationId xmlns:a16="http://schemas.microsoft.com/office/drawing/2014/main" id="{98F9CE4B-ED10-ED12-5445-A54DF4A02E07}"/>
+              </a:ext>
+            </a:extLst>
+          </p:cNvPr>
+          <p:cNvCxnSpPr>
+            <a:cxnSpLocks/>
+          </p:cNvCxnSpPr>
+          <p:nvPr/>
+        </p:nvCxnSpPr>
+        <p:spPr>
+          <a:xfrm flipV="1">
+            <a:off x="8498541" y="1137237"/>
+            <a:ext cx="0" cy="5255879"/>
+          </a:xfrm>
+          <a:prstGeom prst="line">
+            <a:avLst/>
+          </a:prstGeom>
+          <a:ln w="38100">
+            <a:solidFill>
+              <a:schemeClr val="tx1"/>
+            </a:solidFill>
+            <a:prstDash val="dash"/>
+          </a:ln>
+        </p:spPr>
+        <p:style>
+          <a:lnRef idx="2">
+            <a:schemeClr val="accent1"/>
+          </a:lnRef>
+          <a:fillRef idx="0">
+            <a:schemeClr val="accent1"/>
+          </a:fillRef>
+          <a:effectRef idx="1">
+            <a:schemeClr val="accent1"/>
+          </a:effectRef>
+          <a:fontRef idx="minor">
+            <a:schemeClr val="tx1"/>
+          </a:fontRef>
+        </p:style>
+      </p:cxnSp>
+    </p:spTree>
+    <p:extLst>
+      <p:ext uri="{BB962C8B-B14F-4D97-AF65-F5344CB8AC3E}">
+        <p14:creationId xmlns:p14="http://schemas.microsoft.com/office/powerpoint/2010/main" val="82588961"/>
+      </p:ext>
+    </p:extLst>
+  </p:cSld>
+  <p:clrMapOvr>
+    <a:masterClrMapping/>
+  </p:clrMapOvr>
+</p:sld>
+</file>
+
+<file path=ppt/slides/slide6.xml><?xml version="1.0" encoding="utf-8"?>
+<p:sld xmlns:a="http://schemas.openxmlformats.org/drawingml/2006/main" xmlns:r="http://schemas.openxmlformats.org/officeDocument/2006/relationships" xmlns:p="http://schemas.openxmlformats.org/presentationml/2006/main">
+  <p:cSld>
+    <p:spTree>
+      <p:nvGrpSpPr>
+        <p:cNvPr id="1" name="">
+          <a:extLst>
+            <a:ext uri="{FF2B5EF4-FFF2-40B4-BE49-F238E27FC236}">
+              <a16:creationId xmlns:a16="http://schemas.microsoft.com/office/drawing/2014/main" id="{94EC615A-39FA-CE5F-EC99-DD081994951F}"/>
+            </a:ext>
+          </a:extLst>
+        </p:cNvPr>
+        <p:cNvGrpSpPr/>
+        <p:nvPr/>
+      </p:nvGrpSpPr>
+      <p:grpSpPr>
+        <a:xfrm>
+          <a:off x="0" y="0"/>
+          <a:ext cx="0" cy="0"/>
+          <a:chOff x="0" y="0"/>
+          <a:chExt cx="0" cy="0"/>
+        </a:xfrm>
+      </p:grpSpPr>
+      <p:cxnSp>
+        <p:nvCxnSpPr>
+          <p:cNvPr id="89" name="Straight Arrow Connector 88">
+            <a:extLst>
+              <a:ext uri="{FF2B5EF4-FFF2-40B4-BE49-F238E27FC236}">
+                <a16:creationId xmlns:a16="http://schemas.microsoft.com/office/drawing/2014/main" id="{8E64E6CD-FACB-3ECC-867C-0194C8B04BDF}"/>
+              </a:ext>
+            </a:extLst>
+          </p:cNvPr>
+          <p:cNvCxnSpPr>
+            <a:cxnSpLocks/>
+          </p:cNvCxnSpPr>
+          <p:nvPr/>
+        </p:nvCxnSpPr>
+        <p:spPr>
+          <a:xfrm>
+            <a:off x="3205245" y="1455880"/>
+            <a:ext cx="1217234" cy="0"/>
+          </a:xfrm>
+          <a:prstGeom prst="straightConnector1">
+            <a:avLst/>
+          </a:prstGeom>
+          <a:ln w="76200">
+            <a:solidFill>
+              <a:schemeClr val="tx1"/>
+            </a:solidFill>
+            <a:tailEnd type="triangle"/>
+          </a:ln>
+        </p:spPr>
+        <p:style>
+          <a:lnRef idx="2">
+            <a:schemeClr val="dk1"/>
+          </a:lnRef>
+          <a:fillRef idx="0">
+            <a:schemeClr val="dk1"/>
+          </a:fillRef>
+          <a:effectRef idx="1">
+            <a:schemeClr val="dk1"/>
+          </a:effectRef>
+          <a:fontRef idx="minor">
+            <a:schemeClr val="tx1"/>
+          </a:fontRef>
+        </p:style>
+      </p:cxnSp>
+      <p:sp>
+        <p:nvSpPr>
+          <p:cNvPr id="4" name="Flowchart: Document 3">
+            <a:extLst>
+              <a:ext uri="{FF2B5EF4-FFF2-40B4-BE49-F238E27FC236}">
+                <a16:creationId xmlns:a16="http://schemas.microsoft.com/office/drawing/2014/main" id="{0326DF28-3146-D20C-FEFD-5F0162796FF5}"/>
+              </a:ext>
+            </a:extLst>
+          </p:cNvPr>
+          <p:cNvSpPr/>
+          <p:nvPr/>
+        </p:nvSpPr>
+        <p:spPr>
+          <a:xfrm>
+            <a:off x="294524" y="1304960"/>
+            <a:ext cx="2910722" cy="1643420"/>
+          </a:xfrm>
+          <a:prstGeom prst="flowChartDocument">
+            <a:avLst/>
+          </a:prstGeom>
+          <a:solidFill>
+            <a:srgbClr val="19A796"/>
+          </a:solidFill>
+        </p:spPr>
+        <p:style>
+          <a:lnRef idx="2">
+            <a:schemeClr val="accent1">
+              <a:shade val="15000"/>
+            </a:schemeClr>
+          </a:lnRef>
+          <a:fillRef idx="1">
+            <a:schemeClr val="accent1"/>
+          </a:fillRef>
+          <a:effectRef idx="0">
+            <a:schemeClr val="accent1"/>
+          </a:effectRef>
+          <a:fontRef idx="minor">
+            <a:schemeClr val="lt1"/>
+          </a:fontRef>
+        </p:style>
+        <p:txBody>
+          <a:bodyPr wrap="square" rtlCol="0" anchor="t" anchorCtr="0">
+            <a:spAutoFit/>
+          </a:bodyPr>
+          <a:lstStyle/>
+          <a:p>
+            <a:r>
+              <a:rPr lang="en-US" sz="1600" b="1" u="sng" dirty="0"/>
+              <a:t>Init</a:t>
+            </a:r>
+          </a:p>
+          <a:p>
+            <a:pPr marL="285750" indent="-285750">
+              <a:buFont typeface="Arial" panose="020B0604020202020204" pitchFamily="34" charset="0"/>
+              <a:buChar char="•"/>
+            </a:pPr>
+            <a:r>
+              <a:rPr lang="en-US" sz="1600" dirty="0"/>
+              <a:t>I2C slave operation</a:t>
+            </a:r>
+          </a:p>
+          <a:p>
+            <a:pPr marL="285750" indent="-285750">
+              <a:buFont typeface="Arial" panose="020B0604020202020204" pitchFamily="34" charset="0"/>
+              <a:buChar char="•"/>
+            </a:pPr>
+            <a:r>
+              <a:rPr lang="en-US" sz="1600" dirty="0"/>
+              <a:t>LCD initialization (pins,8-bit mode, </a:t>
+            </a:r>
+            <a:r>
+              <a:rPr lang="en-US" sz="1600"/>
+              <a:t>cursor mode)</a:t>
+            </a:r>
+            <a:endParaRPr lang="en-US" sz="1600" dirty="0"/>
+          </a:p>
+          <a:p>
+            <a:pPr marL="285750" indent="-285750">
+              <a:buFont typeface="Arial" panose="020B0604020202020204" pitchFamily="34" charset="0"/>
+              <a:buChar char="•"/>
+            </a:pPr>
+            <a:endParaRPr lang="en-US" sz="1600" dirty="0"/>
+          </a:p>
+        </p:txBody>
+      </p:sp>
+      <p:sp>
+        <p:nvSpPr>
+          <p:cNvPr id="5" name="Rectangle: Rounded Corners 4">
+            <a:extLst>
+              <a:ext uri="{FF2B5EF4-FFF2-40B4-BE49-F238E27FC236}">
+                <a16:creationId xmlns:a16="http://schemas.microsoft.com/office/drawing/2014/main" id="{CEBAE152-6A38-0CBC-B8C2-55ACEB7D56D8}"/>
+              </a:ext>
+            </a:extLst>
+          </p:cNvPr>
+          <p:cNvSpPr/>
+          <p:nvPr/>
+        </p:nvSpPr>
+        <p:spPr>
+          <a:xfrm>
+            <a:off x="4422479" y="1268594"/>
+            <a:ext cx="2078958" cy="374571"/>
+          </a:xfrm>
+          <a:prstGeom prst="roundRect">
+            <a:avLst/>
+          </a:prstGeom>
+          <a:solidFill>
+            <a:schemeClr val="accent2"/>
+          </a:solidFill>
+        </p:spPr>
+        <p:style>
+          <a:lnRef idx="2">
+            <a:schemeClr val="accent1">
+              <a:shade val="15000"/>
+            </a:schemeClr>
+          </a:lnRef>
+          <a:fillRef idx="1">
+            <a:schemeClr val="accent1"/>
+          </a:fillRef>
+          <a:effectRef idx="0">
+            <a:schemeClr val="accent1"/>
+          </a:effectRef>
+          <a:fontRef idx="minor">
+            <a:schemeClr val="lt1"/>
+          </a:fontRef>
+        </p:style>
+        <p:txBody>
+          <a:bodyPr wrap="square" rtlCol="0" anchor="ctr">
+            <a:spAutoFit/>
+          </a:bodyPr>
+          <a:lstStyle/>
+          <a:p>
+            <a:pPr algn="ctr"/>
+            <a:r>
+              <a:rPr lang="en-US" sz="1600" b="1" u="sng" dirty="0"/>
+              <a:t>Main</a:t>
+            </a:r>
+          </a:p>
+        </p:txBody>
+      </p:sp>
+      <p:sp>
+        <p:nvSpPr>
+          <p:cNvPr id="87" name="TextBox 86">
+            <a:extLst>
+              <a:ext uri="{FF2B5EF4-FFF2-40B4-BE49-F238E27FC236}">
+                <a16:creationId xmlns:a16="http://schemas.microsoft.com/office/drawing/2014/main" id="{2171C6BF-A282-2438-D2B7-9B3BAB8C6E3A}"/>
+              </a:ext>
+            </a:extLst>
+          </p:cNvPr>
+          <p:cNvSpPr txBox="1"/>
+          <p:nvPr/>
+        </p:nvSpPr>
+        <p:spPr>
+          <a:xfrm>
+            <a:off x="3205245" y="241954"/>
+            <a:ext cx="7082132" cy="707886"/>
+          </a:xfrm>
+          <a:prstGeom prst="rect">
+            <a:avLst/>
+          </a:prstGeom>
+          <a:noFill/>
+        </p:spPr>
+        <p:txBody>
+          <a:bodyPr wrap="none" rtlCol="0">
+            <a:spAutoFit/>
+          </a:bodyPr>
+          <a:lstStyle/>
+          <a:p>
+            <a:r>
+              <a:rPr lang="en-US" sz="4000" dirty="0"/>
+              <a:t>Project 4 Flowchart – LCD Disp.</a:t>
+            </a:r>
+          </a:p>
+        </p:txBody>
+      </p:sp>
+      <p:cxnSp>
+        <p:nvCxnSpPr>
+          <p:cNvPr id="10" name="Straight Arrow Connector 9">
+            <a:extLst>
+              <a:ext uri="{FF2B5EF4-FFF2-40B4-BE49-F238E27FC236}">
+                <a16:creationId xmlns:a16="http://schemas.microsoft.com/office/drawing/2014/main" id="{0E0A5710-21AA-58F3-860B-A15466AE4611}"/>
+              </a:ext>
+            </a:extLst>
+          </p:cNvPr>
+          <p:cNvCxnSpPr>
+            <a:cxnSpLocks/>
+            <a:stCxn id="5" idx="2"/>
+          </p:cNvCxnSpPr>
+          <p:nvPr/>
+        </p:nvCxnSpPr>
+        <p:spPr>
+          <a:xfrm>
+            <a:off x="5461958" y="1643165"/>
+            <a:ext cx="0" cy="442616"/>
+          </a:xfrm>
+          <a:prstGeom prst="straightConnector1">
+            <a:avLst/>
+          </a:prstGeom>
+          <a:ln w="76200">
+            <a:solidFill>
+              <a:schemeClr val="tx1"/>
+            </a:solidFill>
+            <a:tailEnd type="triangle"/>
+          </a:ln>
+        </p:spPr>
+        <p:style>
+          <a:lnRef idx="2">
+            <a:schemeClr val="dk1"/>
+          </a:lnRef>
+          <a:fillRef idx="0">
+            <a:schemeClr val="dk1"/>
+          </a:fillRef>
+          <a:effectRef idx="1">
+            <a:schemeClr val="dk1"/>
+          </a:effectRef>
+          <a:fontRef idx="minor">
+            <a:schemeClr val="tx1"/>
+          </a:fontRef>
+        </p:style>
+      </p:cxnSp>
+      <p:sp>
+        <p:nvSpPr>
+          <p:cNvPr id="24" name="Arrow: U-Turn 23">
+            <a:extLst>
+              <a:ext uri="{FF2B5EF4-FFF2-40B4-BE49-F238E27FC236}">
+                <a16:creationId xmlns:a16="http://schemas.microsoft.com/office/drawing/2014/main" id="{4AAA987E-98B9-2023-C743-2995A83F1732}"/>
+              </a:ext>
+            </a:extLst>
+          </p:cNvPr>
+          <p:cNvSpPr/>
+          <p:nvPr/>
+        </p:nvSpPr>
+        <p:spPr>
+          <a:xfrm rot="16200000" flipV="1">
+            <a:off x="5712746" y="1017805"/>
+            <a:ext cx="882935" cy="1384512"/>
+          </a:xfrm>
+          <a:prstGeom prst="uturnArrow">
+            <a:avLst>
+              <a:gd name="adj1" fmla="val 1891"/>
+              <a:gd name="adj2" fmla="val 16345"/>
+              <a:gd name="adj3" fmla="val 15465"/>
+              <a:gd name="adj4" fmla="val 49178"/>
+              <a:gd name="adj5" fmla="val 22812"/>
+            </a:avLst>
+          </a:prstGeom>
+          <a:solidFill>
+            <a:schemeClr val="tx1"/>
+          </a:solidFill>
+        </p:spPr>
+        <p:style>
+          <a:lnRef idx="2">
+            <a:schemeClr val="accent1">
+              <a:shade val="15000"/>
+            </a:schemeClr>
+          </a:lnRef>
+          <a:fillRef idx="1">
+            <a:schemeClr val="accent1"/>
+          </a:fillRef>
+          <a:effectRef idx="0">
+            <a:schemeClr val="accent1"/>
+          </a:effectRef>
+          <a:fontRef idx="minor">
+            <a:schemeClr val="lt1"/>
+          </a:fontRef>
+        </p:style>
+        <p:txBody>
+          <a:bodyPr rtlCol="0" anchor="ctr"/>
+          <a:lstStyle/>
+          <a:p>
+            <a:pPr algn="ctr"/>
+            <a:endParaRPr lang="en-US">
+              <a:solidFill>
+                <a:schemeClr val="tx1"/>
+              </a:solidFill>
+            </a:endParaRPr>
+          </a:p>
+        </p:txBody>
+      </p:sp>
+      <p:sp>
+        <p:nvSpPr>
+          <p:cNvPr id="27" name="Flowchart: Document 26">
+            <a:extLst>
+              <a:ext uri="{FF2B5EF4-FFF2-40B4-BE49-F238E27FC236}">
+                <a16:creationId xmlns:a16="http://schemas.microsoft.com/office/drawing/2014/main" id="{ED2EBB3B-9C92-D0D8-C4B6-7F7060044B9D}"/>
+              </a:ext>
+            </a:extLst>
+          </p:cNvPr>
+          <p:cNvSpPr/>
+          <p:nvPr/>
+        </p:nvSpPr>
+        <p:spPr>
+          <a:xfrm>
+            <a:off x="8556448" y="1416947"/>
+            <a:ext cx="2910722" cy="1337667"/>
+          </a:xfrm>
+          <a:prstGeom prst="flowChartDocument">
+            <a:avLst/>
+          </a:prstGeom>
+          <a:solidFill>
+            <a:srgbClr val="19A796"/>
+          </a:solidFill>
+        </p:spPr>
+        <p:style>
+          <a:lnRef idx="2">
+            <a:schemeClr val="accent1">
+              <a:shade val="15000"/>
+            </a:schemeClr>
+          </a:lnRef>
+          <a:fillRef idx="1">
+            <a:schemeClr val="accent1"/>
+          </a:fillRef>
+          <a:effectRef idx="0">
+            <a:schemeClr val="accent1"/>
+          </a:effectRef>
+          <a:fontRef idx="minor">
+            <a:schemeClr val="lt1"/>
+          </a:fontRef>
+        </p:style>
+        <p:txBody>
+          <a:bodyPr wrap="square" rtlCol="0" anchor="t" anchorCtr="0">
+            <a:spAutoFit/>
+          </a:bodyPr>
+          <a:lstStyle/>
+          <a:p>
+            <a:r>
+              <a:rPr lang="en-US" sz="1600" b="1" u="sng" dirty="0"/>
+              <a:t>RX ISR:</a:t>
+            </a:r>
+          </a:p>
+          <a:p>
+            <a:pPr marL="285750" indent="-285750">
+              <a:buFont typeface="Arial" panose="020B0604020202020204" pitchFamily="34" charset="0"/>
+              <a:buChar char="•"/>
+            </a:pPr>
+            <a:r>
+              <a:rPr lang="en-US" sz="1600" dirty="0"/>
+              <a:t>Read all characters</a:t>
+            </a:r>
+          </a:p>
+          <a:p>
+            <a:pPr marL="285750" indent="-285750">
+              <a:buFont typeface="Arial" panose="020B0604020202020204" pitchFamily="34" charset="0"/>
+              <a:buChar char="•"/>
+            </a:pPr>
+            <a:r>
+              <a:rPr lang="en-US" sz="1600" dirty="0"/>
+              <a:t>Clear LCD</a:t>
+            </a:r>
+          </a:p>
+          <a:p>
+            <a:pPr marL="285750" indent="-285750">
+              <a:buFont typeface="Arial" panose="020B0604020202020204" pitchFamily="34" charset="0"/>
+              <a:buChar char="•"/>
+            </a:pPr>
+            <a:r>
+              <a:rPr lang="en-US" sz="1600" dirty="0"/>
+              <a:t>Write message to LCD</a:t>
+            </a:r>
+          </a:p>
+        </p:txBody>
+      </p:sp>
+      <p:cxnSp>
+        <p:nvCxnSpPr>
+          <p:cNvPr id="28" name="Straight Connector 27">
+            <a:extLst>
+              <a:ext uri="{FF2B5EF4-FFF2-40B4-BE49-F238E27FC236}">
+                <a16:creationId xmlns:a16="http://schemas.microsoft.com/office/drawing/2014/main" id="{22308F92-DAAD-EA66-AC80-2C3AC48233C4}"/>
+              </a:ext>
+            </a:extLst>
+          </p:cNvPr>
+          <p:cNvCxnSpPr>
+            <a:cxnSpLocks/>
+          </p:cNvCxnSpPr>
+          <p:nvPr/>
+        </p:nvCxnSpPr>
+        <p:spPr>
+          <a:xfrm flipV="1">
+            <a:off x="7991395" y="1075765"/>
+            <a:ext cx="0" cy="5255879"/>
+          </a:xfrm>
+          <a:prstGeom prst="line">
+            <a:avLst/>
+          </a:prstGeom>
+          <a:ln w="38100">
+            <a:solidFill>
+              <a:schemeClr val="tx1"/>
+            </a:solidFill>
+            <a:prstDash val="dash"/>
+          </a:ln>
+        </p:spPr>
+        <p:style>
+          <a:lnRef idx="2">
+            <a:schemeClr val="accent1"/>
+          </a:lnRef>
+          <a:fillRef idx="0">
+            <a:schemeClr val="accent1"/>
+          </a:fillRef>
+          <a:effectRef idx="1">
+            <a:schemeClr val="accent1"/>
+          </a:effectRef>
+          <a:fontRef idx="minor">
+            <a:schemeClr val="tx1"/>
+          </a:fontRef>
+        </p:style>
+      </p:cxnSp>
+    </p:spTree>
+    <p:extLst>
+      <p:ext uri="{BB962C8B-B14F-4D97-AF65-F5344CB8AC3E}">
+        <p14:creationId xmlns:p14="http://schemas.microsoft.com/office/powerpoint/2010/main" val="1415771112"/>
+      </p:ext>
+    </p:extLst>
+  </p:cSld>
+  <p:clrMapOvr>
+    <a:masterClrMapping/>
+  </p:clrMapOvr>
+</p:sld>
+</file>
+
+<file path=ppt/slides/slide7.xml><?xml version="1.0" encoding="utf-8"?>
 <p:sld xmlns:a="http://schemas.openxmlformats.org/drawingml/2006/main" xmlns:r="http://schemas.openxmlformats.org/officeDocument/2006/relationships" xmlns:p="http://schemas.openxmlformats.org/presentationml/2006/main">
   <p:cSld>
     <p:spTree>
@@ -12298,7 +13885,7 @@
 </p:sld>
 </file>
 
-<file path=ppt/slides/slide6.xml><?xml version="1.0" encoding="utf-8"?>
+<file path=ppt/slides/slide8.xml><?xml version="1.0" encoding="utf-8"?>
 <p:sld xmlns:a="http://schemas.openxmlformats.org/drawingml/2006/main" xmlns:r="http://schemas.openxmlformats.org/officeDocument/2006/relationships" xmlns:p="http://schemas.openxmlformats.org/presentationml/2006/main">
   <p:cSld>
     <p:spTree>
@@ -12966,7 +14553,7 @@
 </p:sld>
 </file>
 
-<file path=ppt/slides/slide7.xml><?xml version="1.0" encoding="utf-8"?>
+<file path=ppt/slides/slide9.xml><?xml version="1.0" encoding="utf-8"?>
 <p:sld xmlns:a="http://schemas.openxmlformats.org/drawingml/2006/main" xmlns:r="http://schemas.openxmlformats.org/officeDocument/2006/relationships" xmlns:p="http://schemas.openxmlformats.org/presentationml/2006/main">
   <p:cSld>
     <p:spTree>
@@ -13096,7 +14683,7 @@
         </p:nvSpPr>
         <p:spPr>
           <a:xfrm>
-            <a:off x="4513212" y="1602810"/>
+            <a:off x="4513212" y="1595126"/>
             <a:ext cx="2701524" cy="307777"/>
           </a:xfrm>
           <a:prstGeom prst="rect">
@@ -13134,7 +14721,7 @@
             <a:pPr algn="ctr"/>
             <a:r>
               <a:rPr lang="en-US" sz="1400" dirty="0"/>
-              <a:t>LED Light Bar</a:t>
+              <a:t>LCD Display</a:t>
             </a:r>
           </a:p>
         </p:txBody>
@@ -13314,8 +14901,8 @@
         </p:nvCxnSpPr>
         <p:spPr>
           <a:xfrm flipV="1">
-            <a:off x="5863972" y="1910587"/>
-            <a:ext cx="2" cy="3144400"/>
+            <a:off x="5863972" y="1902903"/>
+            <a:ext cx="2" cy="3152084"/>
           </a:xfrm>
           <a:prstGeom prst="straightConnector1">
             <a:avLst/>

</xml_diff>